<commit_message>
Reduced Powerpoint notes further
</commit_message>
<xml_diff>
--- a/System Documentation/ODS powerpoint.pptx
+++ b/System Documentation/ODS powerpoint.pptx
@@ -5,17 +5,16 @@
     <p:sldMasterId id="2147483648" r:id="rId1"/>
   </p:sldMasterIdLst>
   <p:notesMasterIdLst>
-    <p:notesMasterId r:id="rId10"/>
+    <p:notesMasterId r:id="rId9"/>
   </p:notesMasterIdLst>
   <p:sldIdLst>
-    <p:sldId id="261" r:id="rId2"/>
-    <p:sldId id="257" r:id="rId3"/>
-    <p:sldId id="258" r:id="rId4"/>
-    <p:sldId id="259" r:id="rId5"/>
-    <p:sldId id="260" r:id="rId6"/>
-    <p:sldId id="263" r:id="rId7"/>
-    <p:sldId id="264" r:id="rId8"/>
-    <p:sldId id="265" r:id="rId9"/>
+    <p:sldId id="257" r:id="rId2"/>
+    <p:sldId id="258" r:id="rId3"/>
+    <p:sldId id="259" r:id="rId4"/>
+    <p:sldId id="260" r:id="rId5"/>
+    <p:sldId id="263" r:id="rId6"/>
+    <p:sldId id="264" r:id="rId7"/>
+    <p:sldId id="265" r:id="rId8"/>
   </p:sldIdLst>
   <p:sldSz cx="12192000" cy="6858000"/>
   <p:notesSz cx="6858000" cy="9144000"/>
@@ -129,8 +128,8 @@
 <pc:chgInfo xmlns:a="http://schemas.openxmlformats.org/drawingml/2006/main" xmlns:r="http://schemas.openxmlformats.org/officeDocument/2006/relationships" xmlns:ac="http://schemas.microsoft.com/office/drawing/2013/main/command" xmlns:pc="http://schemas.microsoft.com/office/powerpoint/2013/main/command">
   <pc:docChgLst>
     <pc:chgData name="Alexander Gee" userId="485603e6-5891-4220-a85c-b0950bcd52be" providerId="ADAL" clId="{CDAFFAC8-AF76-4CA3-98AC-3E213656C84F}"/>
-    <pc:docChg chg="undo custSel addSld delSld modSld sldOrd">
-      <pc:chgData name="Alexander Gee" userId="485603e6-5891-4220-a85c-b0950bcd52be" providerId="ADAL" clId="{CDAFFAC8-AF76-4CA3-98AC-3E213656C84F}" dt="2018-03-25T22:47:19.260" v="6348" actId="20577"/>
+    <pc:docChg chg="undo redo custSel addSld delSld modSld sldOrd">
+      <pc:chgData name="Alexander Gee" userId="485603e6-5891-4220-a85c-b0950bcd52be" providerId="ADAL" clId="{CDAFFAC8-AF76-4CA3-98AC-3E213656C84F}" dt="2018-03-26T10:43:55.413" v="6556"/>
       <pc:docMkLst>
         <pc:docMk/>
       </pc:docMkLst>
@@ -142,13 +141,21 @@
         </pc:sldMkLst>
       </pc:sldChg>
       <pc:sldChg chg="addSp delSp modSp modNotesTx">
-        <pc:chgData name="Alexander Gee" userId="485603e6-5891-4220-a85c-b0950bcd52be" providerId="ADAL" clId="{CDAFFAC8-AF76-4CA3-98AC-3E213656C84F}" dt="2018-03-25T12:09:00.144" v="3094" actId="20577"/>
+        <pc:chgData name="Alexander Gee" userId="485603e6-5891-4220-a85c-b0950bcd52be" providerId="ADAL" clId="{CDAFFAC8-AF76-4CA3-98AC-3E213656C84F}" dt="2018-03-26T09:47:21.622" v="6501" actId="20577"/>
         <pc:sldMkLst>
           <pc:docMk/>
           <pc:sldMk cId="937563792" sldId="257"/>
         </pc:sldMkLst>
         <pc:spChg chg="mod">
-          <ac:chgData name="Alexander Gee" userId="485603e6-5891-4220-a85c-b0950bcd52be" providerId="ADAL" clId="{CDAFFAC8-AF76-4CA3-98AC-3E213656C84F}" dt="2018-03-25T12:03:05.244" v="2509" actId="20577"/>
+          <ac:chgData name="Alexander Gee" userId="485603e6-5891-4220-a85c-b0950bcd52be" providerId="ADAL" clId="{CDAFFAC8-AF76-4CA3-98AC-3E213656C84F}" dt="2018-03-26T09:47:21.622" v="6501" actId="20577"/>
+          <ac:spMkLst>
+            <pc:docMk/>
+            <pc:sldMk cId="937563792" sldId="257"/>
+            <ac:spMk id="2" creationId="{D40F2B65-4275-48B5-B963-6BA87F8AF9E7}"/>
+          </ac:spMkLst>
+        </pc:spChg>
+        <pc:spChg chg="mod">
+          <ac:chgData name="Alexander Gee" userId="485603e6-5891-4220-a85c-b0950bcd52be" providerId="ADAL" clId="{CDAFFAC8-AF76-4CA3-98AC-3E213656C84F}" dt="2018-03-26T09:31:03.443" v="6386" actId="6549"/>
           <ac:spMkLst>
             <pc:docMk/>
             <pc:sldMk cId="937563792" sldId="257"/>
@@ -300,7 +307,7 @@
         </pc:picChg>
       </pc:sldChg>
       <pc:sldChg chg="addSp delSp modSp modNotesTx">
-        <pc:chgData name="Alexander Gee" userId="485603e6-5891-4220-a85c-b0950bcd52be" providerId="ADAL" clId="{CDAFFAC8-AF76-4CA3-98AC-3E213656C84F}" dt="2018-03-25T22:18:44.816" v="6160" actId="6549"/>
+        <pc:chgData name="Alexander Gee" userId="485603e6-5891-4220-a85c-b0950bcd52be" providerId="ADAL" clId="{CDAFFAC8-AF76-4CA3-98AC-3E213656C84F}" dt="2018-03-26T10:43:55.413" v="6556"/>
         <pc:sldMkLst>
           <pc:docMk/>
           <pc:sldMk cId="1108688081" sldId="259"/>
@@ -346,7 +353,7 @@
           </ac:graphicFrameMkLst>
         </pc:graphicFrameChg>
         <pc:graphicFrameChg chg="add mod modGraphic">
-          <ac:chgData name="Alexander Gee" userId="485603e6-5891-4220-a85c-b0950bcd52be" providerId="ADAL" clId="{CDAFFAC8-AF76-4CA3-98AC-3E213656C84F}" dt="2018-03-25T11:57:04.595" v="2367" actId="2164"/>
+          <ac:chgData name="Alexander Gee" userId="485603e6-5891-4220-a85c-b0950bcd52be" providerId="ADAL" clId="{CDAFFAC8-AF76-4CA3-98AC-3E213656C84F}" dt="2018-03-26T10:43:55.413" v="6556"/>
           <ac:graphicFrameMkLst>
             <pc:docMk/>
             <pc:sldMk cId="1108688081" sldId="259"/>
@@ -379,7 +386,7 @@
         </pc:picChg>
       </pc:sldChg>
       <pc:sldChg chg="addSp delSp modSp modNotesTx">
-        <pc:chgData name="Alexander Gee" userId="485603e6-5891-4220-a85c-b0950bcd52be" providerId="ADAL" clId="{CDAFFAC8-AF76-4CA3-98AC-3E213656C84F}" dt="2018-03-25T22:41:42.932" v="6204" actId="20577"/>
+        <pc:chgData name="Alexander Gee" userId="485603e6-5891-4220-a85c-b0950bcd52be" providerId="ADAL" clId="{CDAFFAC8-AF76-4CA3-98AC-3E213656C84F}" dt="2018-03-26T10:43:41.674" v="6552" actId="20577"/>
         <pc:sldMkLst>
           <pc:docMk/>
           <pc:sldMk cId="2851834824" sldId="260"/>
@@ -417,7 +424,7 @@
           </ac:spMkLst>
         </pc:spChg>
         <pc:graphicFrameChg chg="add mod modGraphic">
-          <ac:chgData name="Alexander Gee" userId="485603e6-5891-4220-a85c-b0950bcd52be" providerId="ADAL" clId="{CDAFFAC8-AF76-4CA3-98AC-3E213656C84F}" dt="2018-03-25T11:57:01.703" v="2366" actId="2164"/>
+          <ac:chgData name="Alexander Gee" userId="485603e6-5891-4220-a85c-b0950bcd52be" providerId="ADAL" clId="{CDAFFAC8-AF76-4CA3-98AC-3E213656C84F}" dt="2018-03-26T10:43:41.674" v="6552" actId="20577"/>
           <ac:graphicFrameMkLst>
             <pc:docMk/>
             <pc:sldMk cId="2851834824" sldId="260"/>
@@ -449,8 +456,8 @@
           </ac:picMkLst>
         </pc:picChg>
       </pc:sldChg>
-      <pc:sldChg chg="addSp delSp modSp ord modNotesTx">
-        <pc:chgData name="Alexander Gee" userId="485603e6-5891-4220-a85c-b0950bcd52be" providerId="ADAL" clId="{CDAFFAC8-AF76-4CA3-98AC-3E213656C84F}" dt="2018-03-25T12:05:59.834" v="2648" actId="20577"/>
+      <pc:sldChg chg="addSp delSp modSp del ord modNotesTx">
+        <pc:chgData name="Alexander Gee" userId="485603e6-5891-4220-a85c-b0950bcd52be" providerId="ADAL" clId="{CDAFFAC8-AF76-4CA3-98AC-3E213656C84F}" dt="2018-03-26T08:46:03.826" v="6349" actId="2696"/>
         <pc:sldMkLst>
           <pc:docMk/>
           <pc:sldMk cId="2622074118" sldId="261"/>
@@ -536,7 +543,7 @@
         </pc:graphicFrameChg>
       </pc:sldChg>
       <pc:sldChg chg="addSp delSp modSp add modNotesTx">
-        <pc:chgData name="Alexander Gee" userId="485603e6-5891-4220-a85c-b0950bcd52be" providerId="ADAL" clId="{CDAFFAC8-AF76-4CA3-98AC-3E213656C84F}" dt="2018-03-25T22:43:14.394" v="6332" actId="6549"/>
+        <pc:chgData name="Alexander Gee" userId="485603e6-5891-4220-a85c-b0950bcd52be" providerId="ADAL" clId="{CDAFFAC8-AF76-4CA3-98AC-3E213656C84F}" dt="2018-03-26T10:43:48.190" v="6553"/>
         <pc:sldMkLst>
           <pc:docMk/>
           <pc:sldMk cId="1957153345" sldId="263"/>
@@ -549,20 +556,20 @@
             <ac:spMk id="2" creationId="{1C42D70D-174E-4F6B-81CC-A4C4FE4B1321}"/>
           </ac:spMkLst>
         </pc:spChg>
+        <pc:spChg chg="del">
+          <ac:chgData name="Alexander Gee" userId="485603e6-5891-4220-a85c-b0950bcd52be" providerId="ADAL" clId="{CDAFFAC8-AF76-4CA3-98AC-3E213656C84F}" dt="2018-03-25T10:10:35.346" v="1239" actId="478"/>
+          <ac:spMkLst>
+            <pc:docMk/>
+            <pc:sldMk cId="1957153345" sldId="263"/>
+            <ac:spMk id="3" creationId="{565FBDF0-91BC-4ED7-A7A8-8C7D8B1950C8}"/>
+          </ac:spMkLst>
+        </pc:spChg>
         <pc:spChg chg="add mod">
           <ac:chgData name="Alexander Gee" userId="485603e6-5891-4220-a85c-b0950bcd52be" providerId="ADAL" clId="{CDAFFAC8-AF76-4CA3-98AC-3E213656C84F}" dt="2018-03-25T12:24:34.488" v="4674" actId="1076"/>
           <ac:spMkLst>
             <pc:docMk/>
             <pc:sldMk cId="1957153345" sldId="263"/>
             <ac:spMk id="3" creationId="{35AF39F4-92E0-4E35-9B89-26959511F275}"/>
-          </ac:spMkLst>
-        </pc:spChg>
-        <pc:spChg chg="del">
-          <ac:chgData name="Alexander Gee" userId="485603e6-5891-4220-a85c-b0950bcd52be" providerId="ADAL" clId="{CDAFFAC8-AF76-4CA3-98AC-3E213656C84F}" dt="2018-03-25T10:10:35.346" v="1239" actId="478"/>
-          <ac:spMkLst>
-            <pc:docMk/>
-            <pc:sldMk cId="1957153345" sldId="263"/>
-            <ac:spMk id="3" creationId="{565FBDF0-91BC-4ED7-A7A8-8C7D8B1950C8}"/>
           </ac:spMkLst>
         </pc:spChg>
         <pc:spChg chg="add">
@@ -574,15 +581,23 @@
           </ac:spMkLst>
         </pc:spChg>
         <pc:spChg chg="add mod">
-          <ac:chgData name="Alexander Gee" userId="485603e6-5891-4220-a85c-b0950bcd52be" providerId="ADAL" clId="{CDAFFAC8-AF76-4CA3-98AC-3E213656C84F}" dt="2018-03-25T12:24:03.951" v="4624" actId="1076"/>
+          <ac:chgData name="Alexander Gee" userId="485603e6-5891-4220-a85c-b0950bcd52be" providerId="ADAL" clId="{CDAFFAC8-AF76-4CA3-98AC-3E213656C84F}" dt="2018-03-26T09:34:14.964" v="6397" actId="1076"/>
           <ac:spMkLst>
             <pc:docMk/>
             <pc:sldMk cId="1957153345" sldId="263"/>
             <ac:spMk id="9" creationId="{24372204-28AF-4EFE-AADD-4986E8246FF4}"/>
           </ac:spMkLst>
         </pc:spChg>
+        <pc:spChg chg="add mod">
+          <ac:chgData name="Alexander Gee" userId="485603e6-5891-4220-a85c-b0950bcd52be" providerId="ADAL" clId="{CDAFFAC8-AF76-4CA3-98AC-3E213656C84F}" dt="2018-03-26T09:45:28.937" v="6486" actId="1076"/>
+          <ac:spMkLst>
+            <pc:docMk/>
+            <pc:sldMk cId="1957153345" sldId="263"/>
+            <ac:spMk id="10" creationId="{FB0025AF-4BBE-4D9A-8A72-ADE6ADE947BC}"/>
+          </ac:spMkLst>
+        </pc:spChg>
         <pc:graphicFrameChg chg="add mod modGraphic">
-          <ac:chgData name="Alexander Gee" userId="485603e6-5891-4220-a85c-b0950bcd52be" providerId="ADAL" clId="{CDAFFAC8-AF76-4CA3-98AC-3E213656C84F}" dt="2018-03-25T11:56:49.987" v="2363" actId="2164"/>
+          <ac:chgData name="Alexander Gee" userId="485603e6-5891-4220-a85c-b0950bcd52be" providerId="ADAL" clId="{CDAFFAC8-AF76-4CA3-98AC-3E213656C84F}" dt="2018-03-26T10:43:48.190" v="6553"/>
           <ac:graphicFrameMkLst>
             <pc:docMk/>
             <pc:sldMk cId="1957153345" sldId="263"/>
@@ -598,7 +613,7 @@
           </ac:picMkLst>
         </pc:picChg>
         <pc:picChg chg="add mod">
-          <ac:chgData name="Alexander Gee" userId="485603e6-5891-4220-a85c-b0950bcd52be" providerId="ADAL" clId="{CDAFFAC8-AF76-4CA3-98AC-3E213656C84F}" dt="2018-03-25T22:35:03.435" v="6200" actId="14100"/>
+          <ac:chgData name="Alexander Gee" userId="485603e6-5891-4220-a85c-b0950bcd52be" providerId="ADAL" clId="{CDAFFAC8-AF76-4CA3-98AC-3E213656C84F}" dt="2018-03-26T09:35:02.501" v="6443" actId="14100"/>
           <ac:picMkLst>
             <pc:docMk/>
             <pc:sldMk cId="1957153345" sldId="263"/>
@@ -606,7 +621,7 @@
           </ac:picMkLst>
         </pc:picChg>
         <pc:picChg chg="add mod">
-          <ac:chgData name="Alexander Gee" userId="485603e6-5891-4220-a85c-b0950bcd52be" providerId="ADAL" clId="{CDAFFAC8-AF76-4CA3-98AC-3E213656C84F}" dt="2018-03-25T12:24:01.141" v="4623" actId="1076"/>
+          <ac:chgData name="Alexander Gee" userId="485603e6-5891-4220-a85c-b0950bcd52be" providerId="ADAL" clId="{CDAFFAC8-AF76-4CA3-98AC-3E213656C84F}" dt="2018-03-26T09:34:05.901" v="6395" actId="1076"/>
           <ac:picMkLst>
             <pc:docMk/>
             <pc:sldMk cId="1957153345" sldId="263"/>
@@ -615,7 +630,7 @@
         </pc:picChg>
       </pc:sldChg>
       <pc:sldChg chg="addSp delSp modSp add modNotesTx">
-        <pc:chgData name="Alexander Gee" userId="485603e6-5891-4220-a85c-b0950bcd52be" providerId="ADAL" clId="{CDAFFAC8-AF76-4CA3-98AC-3E213656C84F}" dt="2018-03-25T22:47:19.260" v="6348" actId="20577"/>
+        <pc:chgData name="Alexander Gee" userId="485603e6-5891-4220-a85c-b0950bcd52be" providerId="ADAL" clId="{CDAFFAC8-AF76-4CA3-98AC-3E213656C84F}" dt="2018-03-26T10:43:50.262" v="6554"/>
         <pc:sldMkLst>
           <pc:docMk/>
           <pc:sldMk cId="661383584" sldId="264"/>
@@ -645,7 +660,7 @@
           </ac:spMkLst>
         </pc:spChg>
         <pc:spChg chg="add mod">
-          <ac:chgData name="Alexander Gee" userId="485603e6-5891-4220-a85c-b0950bcd52be" providerId="ADAL" clId="{CDAFFAC8-AF76-4CA3-98AC-3E213656C84F}" dt="2018-03-25T11:59:30.048" v="2435" actId="1076"/>
+          <ac:chgData name="Alexander Gee" userId="485603e6-5891-4220-a85c-b0950bcd52be" providerId="ADAL" clId="{CDAFFAC8-AF76-4CA3-98AC-3E213656C84F}" dt="2018-03-26T09:46:05.145" v="6492" actId="1076"/>
           <ac:spMkLst>
             <pc:docMk/>
             <pc:sldMk cId="661383584" sldId="264"/>
@@ -653,16 +668,24 @@
           </ac:spMkLst>
         </pc:spChg>
         <pc:graphicFrameChg chg="add mod modGraphic">
-          <ac:chgData name="Alexander Gee" userId="485603e6-5891-4220-a85c-b0950bcd52be" providerId="ADAL" clId="{CDAFFAC8-AF76-4CA3-98AC-3E213656C84F}" dt="2018-03-25T11:56:54.214" v="2364" actId="2164"/>
+          <ac:chgData name="Alexander Gee" userId="485603e6-5891-4220-a85c-b0950bcd52be" providerId="ADAL" clId="{CDAFFAC8-AF76-4CA3-98AC-3E213656C84F}" dt="2018-03-26T10:43:50.262" v="6554"/>
           <ac:graphicFrameMkLst>
             <pc:docMk/>
             <pc:sldMk cId="661383584" sldId="264"/>
             <ac:graphicFrameMk id="4" creationId="{A2F03307-37C8-47BC-A64D-5EDC5C67391E}"/>
           </ac:graphicFrameMkLst>
         </pc:graphicFrameChg>
+        <pc:picChg chg="add mod ord">
+          <ac:chgData name="Alexander Gee" userId="485603e6-5891-4220-a85c-b0950bcd52be" providerId="ADAL" clId="{CDAFFAC8-AF76-4CA3-98AC-3E213656C84F}" dt="2018-03-26T09:46:33.992" v="6499" actId="14100"/>
+          <ac:picMkLst>
+            <pc:docMk/>
+            <pc:sldMk cId="661383584" sldId="264"/>
+            <ac:picMk id="3" creationId="{0E1A493B-266F-4EA6-89A9-47BFC40C425A}"/>
+          </ac:picMkLst>
+        </pc:picChg>
       </pc:sldChg>
       <pc:sldChg chg="addSp delSp modSp add modNotesTx">
-        <pc:chgData name="Alexander Gee" userId="485603e6-5891-4220-a85c-b0950bcd52be" providerId="ADAL" clId="{CDAFFAC8-AF76-4CA3-98AC-3E213656C84F}" dt="2018-03-25T22:44:46.173" v="6346" actId="6549"/>
+        <pc:chgData name="Alexander Gee" userId="485603e6-5891-4220-a85c-b0950bcd52be" providerId="ADAL" clId="{CDAFFAC8-AF76-4CA3-98AC-3E213656C84F}" dt="2018-03-26T10:43:51.932" v="6555"/>
         <pc:sldMkLst>
           <pc:docMk/>
           <pc:sldMk cId="3943801269" sldId="265"/>
@@ -700,7 +723,7 @@
           </ac:spMkLst>
         </pc:spChg>
         <pc:graphicFrameChg chg="add mod modGraphic">
-          <ac:chgData name="Alexander Gee" userId="485603e6-5891-4220-a85c-b0950bcd52be" providerId="ADAL" clId="{CDAFFAC8-AF76-4CA3-98AC-3E213656C84F}" dt="2018-03-25T11:56:56.713" v="2365" actId="2164"/>
+          <ac:chgData name="Alexander Gee" userId="485603e6-5891-4220-a85c-b0950bcd52be" providerId="ADAL" clId="{CDAFFAC8-AF76-4CA3-98AC-3E213656C84F}" dt="2018-03-26T10:43:51.932" v="6555"/>
           <ac:graphicFrameMkLst>
             <pc:docMk/>
             <pc:sldMk cId="3943801269" sldId="265"/>
@@ -1162,93 +1185,6 @@
           <a:bodyPr/>
           <a:lstStyle/>
           <a:p>
-            <a:r>
-              <a:rPr lang="en-AU" dirty="0"/>
-              <a:t>I’ll be briefly talking about the Obstacle Detection System, which is highlighted on the Context Diagram</a:t>
-            </a:r>
-          </a:p>
-        </p:txBody>
-      </p:sp>
-      <p:sp>
-        <p:nvSpPr>
-          <p:cNvPr id="4" name="Slide Number Placeholder 3"/>
-          <p:cNvSpPr>
-            <a:spLocks noGrp="1"/>
-          </p:cNvSpPr>
-          <p:nvPr>
-            <p:ph type="sldNum" sz="quarter" idx="10"/>
-          </p:nvPr>
-        </p:nvSpPr>
-        <p:spPr/>
-        <p:txBody>
-          <a:bodyPr/>
-          <a:lstStyle/>
-          <a:p>
-            <a:fld id="{02FE743E-A84C-43AB-92CE-28D1DBE6EC7B}" type="slidenum">
-              <a:rPr lang="en-AU" smtClean="0"/>
-              <a:t>1</a:t>
-            </a:fld>
-            <a:endParaRPr lang="en-AU"/>
-          </a:p>
-        </p:txBody>
-      </p:sp>
-    </p:spTree>
-    <p:extLst>
-      <p:ext uri="{BB962C8B-B14F-4D97-AF65-F5344CB8AC3E}">
-        <p14:creationId xmlns:p14="http://schemas.microsoft.com/office/powerpoint/2010/main" val="4164194557"/>
-      </p:ext>
-    </p:extLst>
-  </p:cSld>
-  <p:clrMapOvr>
-    <a:masterClrMapping/>
-  </p:clrMapOvr>
-</p:notes>
-</file>
-
-<file path=ppt/notesSlides/notesSlide2.xml><?xml version="1.0" encoding="utf-8"?>
-<p:notes xmlns:a="http://schemas.openxmlformats.org/drawingml/2006/main" xmlns:r="http://schemas.openxmlformats.org/officeDocument/2006/relationships" xmlns:p="http://schemas.openxmlformats.org/presentationml/2006/main">
-  <p:cSld>
-    <p:spTree>
-      <p:nvGrpSpPr>
-        <p:cNvPr id="1" name=""/>
-        <p:cNvGrpSpPr/>
-        <p:nvPr/>
-      </p:nvGrpSpPr>
-      <p:grpSpPr>
-        <a:xfrm>
-          <a:off x="0" y="0"/>
-          <a:ext cx="0" cy="0"/>
-          <a:chOff x="0" y="0"/>
-          <a:chExt cx="0" cy="0"/>
-        </a:xfrm>
-      </p:grpSpPr>
-      <p:sp>
-        <p:nvSpPr>
-          <p:cNvPr id="2" name="Slide Image Placeholder 1"/>
-          <p:cNvSpPr>
-            <a:spLocks noGrp="1" noRot="1" noChangeAspect="1"/>
-          </p:cNvSpPr>
-          <p:nvPr>
-            <p:ph type="sldImg"/>
-          </p:nvPr>
-        </p:nvSpPr>
-        <p:spPr/>
-      </p:sp>
-      <p:sp>
-        <p:nvSpPr>
-          <p:cNvPr id="3" name="Notes Placeholder 2"/>
-          <p:cNvSpPr>
-            <a:spLocks noGrp="1"/>
-          </p:cNvSpPr>
-          <p:nvPr>
-            <p:ph type="body" idx="1"/>
-          </p:nvPr>
-        </p:nvSpPr>
-        <p:spPr/>
-        <p:txBody>
-          <a:bodyPr/>
-          <a:lstStyle/>
-          <a:p>
             <a:pPr marL="0" marR="0" lvl="0" indent="0" algn="l" defTabSz="914400" rtl="0" eaLnBrk="1" fontAlgn="auto" latinLnBrk="0" hangingPunct="1">
               <a:lnSpc>
                 <a:spcPct val="100000"/>
@@ -1382,7 +1318,7 @@
           <a:p>
             <a:fld id="{02FE743E-A84C-43AB-92CE-28D1DBE6EC7B}" type="slidenum">
               <a:rPr lang="en-AU" smtClean="0"/>
-              <a:t>2</a:t>
+              <a:t>1</a:t>
             </a:fld>
             <a:endParaRPr lang="en-AU"/>
           </a:p>
@@ -1401,7 +1337,7 @@
 </p:notes>
 </file>
 
-<file path=ppt/notesSlides/notesSlide3.xml><?xml version="1.0" encoding="utf-8"?>
+<file path=ppt/notesSlides/notesSlide2.xml><?xml version="1.0" encoding="utf-8"?>
 <p:notes xmlns:a="http://schemas.openxmlformats.org/drawingml/2006/main" xmlns:r="http://schemas.openxmlformats.org/officeDocument/2006/relationships" xmlns:p="http://schemas.openxmlformats.org/presentationml/2006/main">
   <p:cSld>
     <p:spTree>
@@ -1496,7 +1432,7 @@
           <a:p>
             <a:fld id="{02FE743E-A84C-43AB-92CE-28D1DBE6EC7B}" type="slidenum">
               <a:rPr lang="en-AU" smtClean="0"/>
-              <a:t>3</a:t>
+              <a:t>2</a:t>
             </a:fld>
             <a:endParaRPr lang="en-AU"/>
           </a:p>
@@ -1515,7 +1451,7 @@
 </p:notes>
 </file>
 
-<file path=ppt/notesSlides/notesSlide4.xml><?xml version="1.0" encoding="utf-8"?>
+<file path=ppt/notesSlides/notesSlide3.xml><?xml version="1.0" encoding="utf-8"?>
 <p:notes xmlns:a="http://schemas.openxmlformats.org/drawingml/2006/main" xmlns:r="http://schemas.openxmlformats.org/officeDocument/2006/relationships" xmlns:p="http://schemas.openxmlformats.org/presentationml/2006/main">
   <p:cSld>
     <p:spTree>
@@ -1711,7 +1647,7 @@
           <a:p>
             <a:fld id="{02FE743E-A84C-43AB-92CE-28D1DBE6EC7B}" type="slidenum">
               <a:rPr lang="en-AU" smtClean="0"/>
-              <a:t>4</a:t>
+              <a:t>3</a:t>
             </a:fld>
             <a:endParaRPr lang="en-AU"/>
           </a:p>
@@ -1730,7 +1666,7 @@
 </p:notes>
 </file>
 
-<file path=ppt/notesSlides/notesSlide5.xml><?xml version="1.0" encoding="utf-8"?>
+<file path=ppt/notesSlides/notesSlide4.xml><?xml version="1.0" encoding="utf-8"?>
 <p:notes xmlns:a="http://schemas.openxmlformats.org/drawingml/2006/main" xmlns:r="http://schemas.openxmlformats.org/officeDocument/2006/relationships" xmlns:p="http://schemas.openxmlformats.org/presentationml/2006/main">
   <p:cSld>
     <p:spTree>
@@ -1896,7 +1832,7 @@
           <a:p>
             <a:fld id="{02FE743E-A84C-43AB-92CE-28D1DBE6EC7B}" type="slidenum">
               <a:rPr lang="en-AU" smtClean="0"/>
-              <a:t>5</a:t>
+              <a:t>4</a:t>
             </a:fld>
             <a:endParaRPr lang="en-AU"/>
           </a:p>
@@ -1915,7 +1851,7 @@
 </p:notes>
 </file>
 
-<file path=ppt/notesSlides/notesSlide6.xml><?xml version="1.0" encoding="utf-8"?>
+<file path=ppt/notesSlides/notesSlide5.xml><?xml version="1.0" encoding="utf-8"?>
 <p:notes xmlns:a="http://schemas.openxmlformats.org/drawingml/2006/main" xmlns:r="http://schemas.openxmlformats.org/officeDocument/2006/relationships" xmlns:p="http://schemas.openxmlformats.org/presentationml/2006/main">
   <p:cSld>
     <p:spTree>
@@ -2040,7 +1976,7 @@
               <a:p>
                 <a:r>
                   <a:rPr lang="en-AU" dirty="0"/>
-                  <a:t>It has been determined that this range is reasonable, as a contingency a temperature sensor has been selected based on the comparison shown in the table.</a:t>
+                  <a:t>It has been determined that this range is reasonable, as a contingency however a temperature sensor has been selected based on the comparison shown in the table.</a:t>
                 </a:r>
               </a:p>
             </p:txBody>
@@ -2120,7 +2056,7 @@
           <a:p>
             <a:fld id="{02FE743E-A84C-43AB-92CE-28D1DBE6EC7B}" type="slidenum">
               <a:rPr lang="en-AU" smtClean="0"/>
-              <a:t>6</a:t>
+              <a:t>5</a:t>
             </a:fld>
             <a:endParaRPr lang="en-AU"/>
           </a:p>
@@ -2139,7 +2075,7 @@
 </p:notes>
 </file>
 
-<file path=ppt/notesSlides/notesSlide7.xml><?xml version="1.0" encoding="utf-8"?>
+<file path=ppt/notesSlides/notesSlide6.xml><?xml version="1.0" encoding="utf-8"?>
 <p:notes xmlns:a="http://schemas.openxmlformats.org/drawingml/2006/main" xmlns:r="http://schemas.openxmlformats.org/officeDocument/2006/relationships" xmlns:p="http://schemas.openxmlformats.org/presentationml/2006/main">
   <p:cSld>
     <p:spTree>
@@ -2226,13 +2162,29 @@
                 </a14:m>
                 <a:r>
                   <a:rPr lang="en-AU" dirty="0"/>
-                  <a:t> relative to the grid as the range sensors require a near perpendicular surface to operate. </a:t>
+                  <a:t> relative to the grid otherwise the sensors may not work as they require a near perpendicular surface to operate. </a:t>
                 </a:r>
               </a:p>
               <a:p>
                 <a:r>
                   <a:rPr lang="en-AU" dirty="0"/>
-                  <a:t>If it is confirmed that this is a genuine risk, a sweeping technique will be introduced to maximise chance of getting perpendicular surface. </a:t>
+                  <a:t>If required a sweeping technique will be </a:t>
+                </a:r>
+                <a:r>
+                  <a:rPr lang="en-AU"/>
+                  <a:t>introduced to maximise the </a:t>
+                </a:r>
+                <a:r>
+                  <a:rPr lang="en-AU" dirty="0"/>
+                  <a:t>chance </a:t>
+                </a:r>
+                <a:r>
+                  <a:rPr lang="en-AU"/>
+                  <a:t>of getting a </a:t>
+                </a:r>
+                <a:r>
+                  <a:rPr lang="en-AU" dirty="0"/>
+                  <a:t>perpendicular surface. </a:t>
                 </a:r>
               </a:p>
             </p:txBody>
@@ -2302,7 +2254,7 @@
           <a:p>
             <a:fld id="{02FE743E-A84C-43AB-92CE-28D1DBE6EC7B}" type="slidenum">
               <a:rPr lang="en-AU" smtClean="0"/>
-              <a:t>7</a:t>
+              <a:t>6</a:t>
             </a:fld>
             <a:endParaRPr lang="en-AU"/>
           </a:p>
@@ -2321,7 +2273,7 @@
 </p:notes>
 </file>
 
-<file path=ppt/notesSlides/notesSlide8.xml><?xml version="1.0" encoding="utf-8"?>
+<file path=ppt/notesSlides/notesSlide7.xml><?xml version="1.0" encoding="utf-8"?>
 <p:notes xmlns:a="http://schemas.openxmlformats.org/drawingml/2006/main" xmlns:r="http://schemas.openxmlformats.org/officeDocument/2006/relationships" xmlns:p="http://schemas.openxmlformats.org/presentationml/2006/main">
   <p:cSld>
     <p:spTree>
@@ -2379,7 +2331,7 @@
           <a:p>
             <a:r>
               <a:rPr lang="en-AU" dirty="0"/>
-              <a:t>If it is confirmed that this is a genuine risk, each grid square will be broken up into smaller segments to allow for a higher resolution obstacle location allocation as shown in the figure.</a:t>
+              <a:t>If required each grid square will be broken up into smaller segments to allow for higher resolution obstacle locations as shown in the figure.</a:t>
             </a:r>
           </a:p>
         </p:txBody>
@@ -2401,7 +2353,7 @@
           <a:p>
             <a:fld id="{02FE743E-A84C-43AB-92CE-28D1DBE6EC7B}" type="slidenum">
               <a:rPr lang="en-AU" smtClean="0"/>
-              <a:t>8</a:t>
+              <a:t>7</a:t>
             </a:fld>
             <a:endParaRPr lang="en-AU"/>
           </a:p>
@@ -5655,152 +5607,6 @@
           <a:chExt cx="0" cy="0"/>
         </a:xfrm>
       </p:grpSpPr>
-      <p:sp>
-        <p:nvSpPr>
-          <p:cNvPr id="2" name="Title 1">
-            <a:extLst>
-              <a:ext uri="{FF2B5EF4-FFF2-40B4-BE49-F238E27FC236}">
-                <a16:creationId xmlns:a16="http://schemas.microsoft.com/office/drawing/2014/main" id="{455C17F1-2A3F-4CBF-A1EA-13681D4D9C93}"/>
-              </a:ext>
-            </a:extLst>
-          </p:cNvPr>
-          <p:cNvSpPr>
-            <a:spLocks noGrp="1"/>
-          </p:cNvSpPr>
-          <p:nvPr>
-            <p:ph type="title"/>
-          </p:nvPr>
-        </p:nvSpPr>
-        <p:spPr/>
-        <p:txBody>
-          <a:bodyPr/>
-          <a:lstStyle/>
-          <a:p>
-            <a:r>
-              <a:rPr lang="en-AU" dirty="0"/>
-              <a:t>Obstacle Detection System – Context</a:t>
-            </a:r>
-          </a:p>
-        </p:txBody>
-      </p:sp>
-      <p:pic>
-        <p:nvPicPr>
-          <p:cNvPr id="5" name="Picture 4">
-            <a:extLst>
-              <a:ext uri="{FF2B5EF4-FFF2-40B4-BE49-F238E27FC236}">
-                <a16:creationId xmlns:a16="http://schemas.microsoft.com/office/drawing/2014/main" id="{84085CA4-A3B9-45CC-8794-EBA1AFB963E2}"/>
-              </a:ext>
-            </a:extLst>
-          </p:cNvPr>
-          <p:cNvPicPr>
-            <a:picLocks noChangeAspect="1"/>
-          </p:cNvPicPr>
-          <p:nvPr/>
-        </p:nvPicPr>
-        <p:blipFill>
-          <a:blip r:embed="rId3">
-            <a:extLst>
-              <a:ext uri="{28A0092B-C50C-407E-A947-70E740481C1C}">
-                <a14:useLocalDpi xmlns:a14="http://schemas.microsoft.com/office/drawing/2010/main" val="0"/>
-              </a:ext>
-            </a:extLst>
-          </a:blip>
-          <a:stretch>
-            <a:fillRect/>
-          </a:stretch>
-        </p:blipFill>
-        <p:spPr>
-          <a:xfrm>
-            <a:off x="1847849" y="1480046"/>
-            <a:ext cx="8217743" cy="5263653"/>
-          </a:xfrm>
-          <a:prstGeom prst="rect">
-            <a:avLst/>
-          </a:prstGeom>
-        </p:spPr>
-      </p:pic>
-      <p:sp>
-        <p:nvSpPr>
-          <p:cNvPr id="6" name="Oval 5">
-            <a:extLst>
-              <a:ext uri="{FF2B5EF4-FFF2-40B4-BE49-F238E27FC236}">
-                <a16:creationId xmlns:a16="http://schemas.microsoft.com/office/drawing/2014/main" id="{BF7A8D66-83E3-48AE-A4AB-580A882B702B}"/>
-              </a:ext>
-            </a:extLst>
-          </p:cNvPr>
-          <p:cNvSpPr/>
-          <p:nvPr/>
-        </p:nvSpPr>
-        <p:spPr>
-          <a:xfrm>
-            <a:off x="3657599" y="3667125"/>
-            <a:ext cx="990601" cy="847725"/>
-          </a:xfrm>
-          <a:prstGeom prst="ellipse">
-            <a:avLst/>
-          </a:prstGeom>
-          <a:noFill/>
-          <a:ln w="38100">
-            <a:solidFill>
-              <a:srgbClr val="FF0000"/>
-            </a:solidFill>
-          </a:ln>
-        </p:spPr>
-        <p:style>
-          <a:lnRef idx="2">
-            <a:schemeClr val="accent1">
-              <a:shade val="50000"/>
-            </a:schemeClr>
-          </a:lnRef>
-          <a:fillRef idx="1">
-            <a:schemeClr val="accent1"/>
-          </a:fillRef>
-          <a:effectRef idx="0">
-            <a:schemeClr val="accent1"/>
-          </a:effectRef>
-          <a:fontRef idx="minor">
-            <a:schemeClr val="lt1"/>
-          </a:fontRef>
-        </p:style>
-        <p:txBody>
-          <a:bodyPr rtlCol="0" anchor="ctr"/>
-          <a:lstStyle/>
-          <a:p>
-            <a:pPr algn="ctr"/>
-            <a:endParaRPr lang="en-AU"/>
-          </a:p>
-        </p:txBody>
-      </p:sp>
-    </p:spTree>
-    <p:extLst>
-      <p:ext uri="{BB962C8B-B14F-4D97-AF65-F5344CB8AC3E}">
-        <p14:creationId xmlns:p14="http://schemas.microsoft.com/office/powerpoint/2010/main" val="2622074118"/>
-      </p:ext>
-    </p:extLst>
-  </p:cSld>
-  <p:clrMapOvr>
-    <a:masterClrMapping/>
-  </p:clrMapOvr>
-</p:sld>
-</file>
-
-<file path=ppt/slides/slide2.xml><?xml version="1.0" encoding="utf-8"?>
-<p:sld xmlns:a="http://schemas.openxmlformats.org/drawingml/2006/main" xmlns:r="http://schemas.openxmlformats.org/officeDocument/2006/relationships" xmlns:p="http://schemas.openxmlformats.org/presentationml/2006/main">
-  <p:cSld>
-    <p:spTree>
-      <p:nvGrpSpPr>
-        <p:cNvPr id="1" name=""/>
-        <p:cNvGrpSpPr/>
-        <p:nvPr/>
-      </p:nvGrpSpPr>
-      <p:grpSpPr>
-        <a:xfrm>
-          <a:off x="0" y="0"/>
-          <a:ext cx="0" cy="0"/>
-          <a:chOff x="0" y="0"/>
-          <a:chExt cx="0" cy="0"/>
-        </a:xfrm>
-      </p:grpSpPr>
       <p:pic>
         <p:nvPicPr>
           <p:cNvPr id="7" name="Picture 6">
@@ -5860,7 +5666,7 @@
           <a:p>
             <a:r>
               <a:rPr lang="en-AU" dirty="0"/>
-              <a:t>Obstacle Detection System – Black box</a:t>
+              <a:t>Obstacle Detection System - Black box</a:t>
             </a:r>
           </a:p>
         </p:txBody>
@@ -5883,8 +5689,8 @@
         </p:nvSpPr>
         <p:spPr>
           <a:xfrm>
-            <a:off x="3590925" y="2243018"/>
-            <a:ext cx="4972050" cy="4434007"/>
+            <a:off x="3621019" y="3850909"/>
+            <a:ext cx="4972050" cy="1414582"/>
           </a:xfrm>
         </p:spPr>
         <p:txBody>
@@ -5895,32 +5701,8 @@
           <a:p>
             <a:r>
               <a:rPr lang="en-AU" dirty="0"/>
-              <a:t>Purpose: To detect and locate obstacles to allow for more informed navigation decisions, in order to avoid obstacles.</a:t>
+              <a:t>Purpose: To detect and locate obstacles</a:t>
             </a:r>
-          </a:p>
-          <a:p>
-            <a:pPr marL="285750" indent="-285750"/>
-            <a:r>
-              <a:rPr lang="en-AU" dirty="0"/>
-              <a:t>Functions:</a:t>
-            </a:r>
-          </a:p>
-          <a:p>
-            <a:pPr marL="742950" lvl="1" indent="-285750"/>
-            <a:r>
-              <a:rPr lang="en-AU" dirty="0"/>
-              <a:t>Detect obstacles within the range constraints of the HC-SR04 sensors (2cm – 400cm)</a:t>
-            </a:r>
-          </a:p>
-          <a:p>
-            <a:pPr marL="742950" lvl="1" indent="-285750"/>
-            <a:r>
-              <a:rPr lang="en-AU" dirty="0"/>
-              <a:t>Output the grid reference location of detected obstacles to the navigation system</a:t>
-            </a:r>
-          </a:p>
-          <a:p>
-            <a:endParaRPr lang="en-AU" dirty="0"/>
           </a:p>
           <a:p>
             <a:pPr lvl="1"/>
@@ -5941,7 +5723,7 @@
 </p:sld>
 </file>
 
-<file path=ppt/slides/slide3.xml><?xml version="1.0" encoding="utf-8"?>
+<file path=ppt/slides/slide2.xml><?xml version="1.0" encoding="utf-8"?>
 <p:sld xmlns:a="http://schemas.openxmlformats.org/drawingml/2006/main" xmlns:r="http://schemas.openxmlformats.org/officeDocument/2006/relationships" xmlns:p="http://schemas.openxmlformats.org/presentationml/2006/main">
   <p:cSld>
     <p:spTree>
@@ -6074,7 +5856,7 @@
 </p:sld>
 </file>
 
-<file path=ppt/slides/slide4.xml><?xml version="1.0" encoding="utf-8"?>
+<file path=ppt/slides/slide3.xml><?xml version="1.0" encoding="utf-8"?>
 <p:sld xmlns:a="http://schemas.openxmlformats.org/drawingml/2006/main" xmlns:r="http://schemas.openxmlformats.org/officeDocument/2006/relationships" xmlns:p="http://schemas.openxmlformats.org/presentationml/2006/main">
   <p:cSld>
     <p:spTree>
@@ -6152,8 +5934,8 @@
           </a:p>
         </p:txBody>
       </p:sp>
-      <mc:AlternateContent xmlns:mc="http://schemas.openxmlformats.org/markup-compatibility/2006" xmlns:a14="http://schemas.microsoft.com/office/drawing/2010/main">
-        <mc:Choice Requires="a14">
+      <mc:AlternateContent xmlns:mc="http://schemas.openxmlformats.org/markup-compatibility/2006">
+        <mc:Choice xmlns:a14="http://schemas.microsoft.com/office/drawing/2010/main" Requires="a14">
           <p:graphicFrame>
             <p:nvGraphicFramePr>
               <p:cNvPr id="8" name="Table 7">
@@ -6169,7 +5951,7 @@
               <p:nvPr>
                 <p:extLst>
                   <p:ext uri="{D42A27DB-BD31-4B8C-83A1-F6EECF244321}">
-                    <p14:modId xmlns:p14="http://schemas.microsoft.com/office/powerpoint/2010/main" val="2481626879"/>
+                    <p14:modId xmlns:p14="http://schemas.microsoft.com/office/powerpoint/2010/main" val="2923042661"/>
                   </p:ext>
                 </p:extLst>
               </p:nvPr>
@@ -6504,8 +6286,26 @@
                             <a:rPr lang="en-AU" sz="2000" u="none" strike="noStrike" dirty="0">
                               <a:effectLst/>
                             </a:rPr>
-                            <a:t>Accuracy of +/-10cm</a:t>
+                            <a:t>Accuracy of </a:t>
                           </a:r>
+                          <a14:m>
+                            <m:oMath xmlns:m="http://schemas.openxmlformats.org/officeDocument/2006/math">
+                              <m:r>
+                                <a:rPr lang="en-AU" sz="2000" i="1" u="none" strike="noStrike" dirty="0" smtClean="0">
+                                  <a:effectLst/>
+                                  <a:latin typeface="Cambria Math" panose="02040503050406030204" pitchFamily="18" charset="0"/>
+                                </a:rPr>
+                                <m:t>±10</m:t>
+                              </m:r>
+                              <m:r>
+                                <a:rPr lang="en-AU" sz="2000" i="1" u="none" strike="noStrike" dirty="0" smtClean="0">
+                                  <a:effectLst/>
+                                  <a:latin typeface="Cambria Math" panose="02040503050406030204" pitchFamily="18" charset="0"/>
+                                </a:rPr>
+                                <m:t>𝑐𝑚</m:t>
+                              </m:r>
+                            </m:oMath>
+                          </a14:m>
                           <a:endParaRPr lang="en-AU" sz="2000" b="0" i="0" u="none" strike="noStrike" dirty="0">
                             <a:solidFill>
                               <a:srgbClr val="000000"/>
@@ -7014,7 +6814,7 @@
             </a:graphic>
           </p:graphicFrame>
         </mc:Choice>
-        <mc:Fallback xmlns="">
+        <mc:Fallback>
           <p:graphicFrame>
             <p:nvGraphicFramePr>
               <p:cNvPr id="8" name="Table 7">
@@ -7030,7 +6830,7 @@
               <p:nvPr>
                 <p:extLst>
                   <p:ext uri="{D42A27DB-BD31-4B8C-83A1-F6EECF244321}">
-                    <p14:modId xmlns:p14="http://schemas.microsoft.com/office/powerpoint/2010/main" val="2481626879"/>
+                    <p14:modId xmlns:p14="http://schemas.microsoft.com/office/powerpoint/2010/main" val="2923042661"/>
                   </p:ext>
                 </p:extLst>
               </p:nvPr>
@@ -7322,20 +7122,7 @@
                         <a:bodyPr/>
                         <a:lstStyle/>
                         <a:p>
-                          <a:pPr algn="l" fontAlgn="b"/>
-                          <a:r>
-                            <a:rPr lang="en-AU" sz="2000" u="none" strike="noStrike" dirty="0">
-                              <a:effectLst/>
-                            </a:rPr>
-                            <a:t>Accuracy of +/-10cm</a:t>
-                          </a:r>
-                          <a:endParaRPr lang="en-AU" sz="2000" b="0" i="0" u="none" strike="noStrike" dirty="0">
-                            <a:solidFill>
-                              <a:srgbClr val="000000"/>
-                            </a:solidFill>
-                            <a:effectLst/>
-                            <a:latin typeface="Calibri" panose="020F0502020204030204" pitchFamily="34" charset="0"/>
-                          </a:endParaRPr>
+                          <a:endParaRPr lang="en-US"/>
                         </a:p>
                       </a:txBody>
                       <a:tcPr marL="9525" marR="9525" marT="9525" marB="0" anchor="b">
@@ -7375,7 +7162,12 @@
                           <a:headEnd type="none" w="med" len="med"/>
                           <a:tailEnd type="none" w="med" len="med"/>
                         </a:lnB>
-                        <a:noFill/>
+                        <a:blipFill>
+                          <a:blip r:embed="rId3"/>
+                          <a:stretch>
+                            <a:fillRect l="-166" t="-76974" r="-107947" b="-217105"/>
+                          </a:stretch>
+                        </a:blipFill>
                       </a:tcPr>
                     </a:tc>
                     <a:tc>
@@ -7958,7 +7750,7 @@
 </p:sld>
 </file>
 
-<file path=ppt/slides/slide5.xml><?xml version="1.0" encoding="utf-8"?>
+<file path=ppt/slides/slide4.xml><?xml version="1.0" encoding="utf-8"?>
 <p:sld xmlns:a="http://schemas.openxmlformats.org/drawingml/2006/main" xmlns:r="http://schemas.openxmlformats.org/officeDocument/2006/relationships" xmlns:p="http://schemas.openxmlformats.org/presentationml/2006/main">
   <p:cSld>
     <p:spTree>
@@ -8003,8 +7795,8 @@
           </a:p>
         </p:txBody>
       </p:sp>
-      <mc:AlternateContent xmlns:mc="http://schemas.openxmlformats.org/markup-compatibility/2006" xmlns:a14="http://schemas.microsoft.com/office/drawing/2010/main">
-        <mc:Choice Requires="a14">
+      <mc:AlternateContent xmlns:mc="http://schemas.openxmlformats.org/markup-compatibility/2006">
+        <mc:Choice xmlns:a14="http://schemas.microsoft.com/office/drawing/2010/main" Requires="a14">
           <p:graphicFrame>
             <p:nvGraphicFramePr>
               <p:cNvPr id="4" name="Table 3">
@@ -8020,7 +7812,7 @@
               <p:nvPr>
                 <p:extLst>
                   <p:ext uri="{D42A27DB-BD31-4B8C-83A1-F6EECF244321}">
-                    <p14:modId xmlns:p14="http://schemas.microsoft.com/office/powerpoint/2010/main" val="3896073002"/>
+                    <p14:modId xmlns:p14="http://schemas.microsoft.com/office/powerpoint/2010/main" val="769833372"/>
                   </p:ext>
                 </p:extLst>
               </p:nvPr>
@@ -8345,8 +8137,26 @@
                             <a:rPr lang="en-AU" sz="2000" u="none" strike="noStrike" dirty="0">
                               <a:effectLst/>
                             </a:rPr>
-                            <a:t>Accuracy of +/-10cm</a:t>
+                            <a:t>Accuracy of </a:t>
                           </a:r>
+                          <a14:m>
+                            <m:oMath xmlns:m="http://schemas.openxmlformats.org/officeDocument/2006/math">
+                              <m:r>
+                                <a:rPr lang="en-AU" sz="2000" i="1" u="none" strike="noStrike" dirty="0" smtClean="0">
+                                  <a:effectLst/>
+                                  <a:latin typeface="Cambria Math" panose="02040503050406030204" pitchFamily="18" charset="0"/>
+                                </a:rPr>
+                                <m:t>±10</m:t>
+                              </m:r>
+                              <m:r>
+                                <a:rPr lang="en-AU" sz="2000" i="1" u="none" strike="noStrike" dirty="0" smtClean="0">
+                                  <a:effectLst/>
+                                  <a:latin typeface="Cambria Math" panose="02040503050406030204" pitchFamily="18" charset="0"/>
+                                </a:rPr>
+                                <m:t>𝑐𝑚</m:t>
+                              </m:r>
+                            </m:oMath>
+                          </a14:m>
                           <a:endParaRPr lang="en-AU" sz="2000" b="0" i="0" u="none" strike="noStrike" dirty="0">
                             <a:solidFill>
                               <a:srgbClr val="000000"/>
@@ -8865,7 +8675,7 @@
             </a:graphic>
           </p:graphicFrame>
         </mc:Choice>
-        <mc:Fallback xmlns="">
+        <mc:Fallback>
           <p:graphicFrame>
             <p:nvGraphicFramePr>
               <p:cNvPr id="4" name="Table 3">
@@ -8881,7 +8691,7 @@
               <p:nvPr>
                 <p:extLst>
                   <p:ext uri="{D42A27DB-BD31-4B8C-83A1-F6EECF244321}">
-                    <p14:modId xmlns:p14="http://schemas.microsoft.com/office/powerpoint/2010/main" val="3896073002"/>
+                    <p14:modId xmlns:p14="http://schemas.microsoft.com/office/powerpoint/2010/main" val="769833372"/>
                   </p:ext>
                 </p:extLst>
               </p:nvPr>
@@ -9168,20 +8978,7 @@
                         <a:bodyPr/>
                         <a:lstStyle/>
                         <a:p>
-                          <a:pPr algn="l" fontAlgn="b"/>
-                          <a:r>
-                            <a:rPr lang="en-AU" sz="2000" u="none" strike="noStrike" dirty="0">
-                              <a:effectLst/>
-                            </a:rPr>
-                            <a:t>Accuracy of +/-10cm</a:t>
-                          </a:r>
-                          <a:endParaRPr lang="en-AU" sz="2000" b="0" i="0" u="none" strike="noStrike" dirty="0">
-                            <a:solidFill>
-                              <a:srgbClr val="000000"/>
-                            </a:solidFill>
-                            <a:effectLst/>
-                            <a:latin typeface="Calibri" panose="020F0502020204030204" pitchFamily="34" charset="0"/>
-                          </a:endParaRPr>
+                          <a:endParaRPr lang="en-US"/>
                         </a:p>
                       </a:txBody>
                       <a:tcPr marL="9525" marR="9525" marT="9525" marB="0" anchor="b">
@@ -9221,12 +9018,12 @@
                           <a:headEnd type="none" w="med" len="med"/>
                           <a:tailEnd type="none" w="med" len="med"/>
                         </a:lnB>
-                        <a:solidFill>
-                          <a:schemeClr val="accent1">
-                            <a:lumMod val="40000"/>
-                            <a:lumOff val="60000"/>
-                          </a:schemeClr>
-                        </a:solidFill>
+                        <a:blipFill>
+                          <a:blip r:embed="rId3"/>
+                          <a:stretch>
+                            <a:fillRect l="-166" t="-76974" r="-107947" b="-217105"/>
+                          </a:stretch>
+                        </a:blipFill>
                       </a:tcPr>
                     </a:tc>
                     <a:tc>
@@ -9814,7 +9611,7 @@
 </p:sld>
 </file>
 
-<file path=ppt/slides/slide6.xml><?xml version="1.0" encoding="utf-8"?>
+<file path=ppt/slides/slide5.xml><?xml version="1.0" encoding="utf-8"?>
 <p:sld xmlns:a="http://schemas.openxmlformats.org/drawingml/2006/main" xmlns:r="http://schemas.openxmlformats.org/officeDocument/2006/relationships" xmlns:p="http://schemas.openxmlformats.org/presentationml/2006/main">
   <p:cSld>
     <p:spTree>
@@ -9859,8 +9656,8 @@
           </a:p>
         </p:txBody>
       </p:sp>
-      <mc:AlternateContent xmlns:mc="http://schemas.openxmlformats.org/markup-compatibility/2006" xmlns:a14="http://schemas.microsoft.com/office/drawing/2010/main">
-        <mc:Choice Requires="a14">
+      <mc:AlternateContent xmlns:mc="http://schemas.openxmlformats.org/markup-compatibility/2006">
+        <mc:Choice xmlns:a14="http://schemas.microsoft.com/office/drawing/2010/main" Requires="a14">
           <p:graphicFrame>
             <p:nvGraphicFramePr>
               <p:cNvPr id="4" name="Table 3">
@@ -9876,7 +9673,7 @@
               <p:nvPr>
                 <p:extLst>
                   <p:ext uri="{D42A27DB-BD31-4B8C-83A1-F6EECF244321}">
-                    <p14:modId xmlns:p14="http://schemas.microsoft.com/office/powerpoint/2010/main" val="4013103301"/>
+                    <p14:modId xmlns:p14="http://schemas.microsoft.com/office/powerpoint/2010/main" val="3173940156"/>
                   </p:ext>
                 </p:extLst>
               </p:nvPr>
@@ -10201,8 +9998,26 @@
                             <a:rPr lang="en-AU" sz="2000" u="none" strike="noStrike" dirty="0">
                               <a:effectLst/>
                             </a:rPr>
-                            <a:t>Accuracy of +/-10cm</a:t>
+                            <a:t>Accuracy of </a:t>
                           </a:r>
+                          <a14:m>
+                            <m:oMath xmlns:m="http://schemas.openxmlformats.org/officeDocument/2006/math">
+                              <m:r>
+                                <a:rPr lang="en-AU" sz="2000" i="1" u="none" strike="noStrike" dirty="0" smtClean="0">
+                                  <a:effectLst/>
+                                  <a:latin typeface="Cambria Math" panose="02040503050406030204" pitchFamily="18" charset="0"/>
+                                </a:rPr>
+                                <m:t>±10</m:t>
+                              </m:r>
+                              <m:r>
+                                <a:rPr lang="en-AU" sz="2000" i="1" u="none" strike="noStrike" dirty="0" smtClean="0">
+                                  <a:effectLst/>
+                                  <a:latin typeface="Cambria Math" panose="02040503050406030204" pitchFamily="18" charset="0"/>
+                                </a:rPr>
+                                <m:t>𝑐𝑚</m:t>
+                              </m:r>
+                            </m:oMath>
+                          </a14:m>
                           <a:endParaRPr lang="en-AU" sz="2000" b="0" i="0" u="none" strike="noStrike" dirty="0">
                             <a:solidFill>
                               <a:srgbClr val="000000"/>
@@ -10721,7 +10536,7 @@
             </a:graphic>
           </p:graphicFrame>
         </mc:Choice>
-        <mc:Fallback xmlns="">
+        <mc:Fallback>
           <p:graphicFrame>
             <p:nvGraphicFramePr>
               <p:cNvPr id="4" name="Table 3">
@@ -10737,7 +10552,7 @@
               <p:nvPr>
                 <p:extLst>
                   <p:ext uri="{D42A27DB-BD31-4B8C-83A1-F6EECF244321}">
-                    <p14:modId xmlns:p14="http://schemas.microsoft.com/office/powerpoint/2010/main" val="4013103301"/>
+                    <p14:modId xmlns:p14="http://schemas.microsoft.com/office/powerpoint/2010/main" val="3173940156"/>
                   </p:ext>
                 </p:extLst>
               </p:nvPr>
@@ -11024,20 +10839,7 @@
                         <a:bodyPr/>
                         <a:lstStyle/>
                         <a:p>
-                          <a:pPr algn="l" fontAlgn="b"/>
-                          <a:r>
-                            <a:rPr lang="en-AU" sz="2000" u="none" strike="noStrike" dirty="0">
-                              <a:effectLst/>
-                            </a:rPr>
-                            <a:t>Accuracy of +/-10cm</a:t>
-                          </a:r>
-                          <a:endParaRPr lang="en-AU" sz="2000" b="0" i="0" u="none" strike="noStrike" dirty="0">
-                            <a:solidFill>
-                              <a:srgbClr val="000000"/>
-                            </a:solidFill>
-                            <a:effectLst/>
-                            <a:latin typeface="Calibri" panose="020F0502020204030204" pitchFamily="34" charset="0"/>
-                          </a:endParaRPr>
+                          <a:endParaRPr lang="en-US"/>
                         </a:p>
                       </a:txBody>
                       <a:tcPr marL="9525" marR="9525" marT="9525" marB="0" anchor="b">
@@ -11077,7 +10879,12 @@
                           <a:headEnd type="none" w="med" len="med"/>
                           <a:tailEnd type="none" w="med" len="med"/>
                         </a:lnB>
-                        <a:noFill/>
+                        <a:blipFill>
+                          <a:blip r:embed="rId3"/>
+                          <a:stretch>
+                            <a:fillRect l="-166" t="-76974" r="-107947" b="-217105"/>
+                          </a:stretch>
+                        </a:blipFill>
                       </a:tcPr>
                     </a:tc>
                     <a:tc>
@@ -11608,8 +11415,8 @@
         </p:blipFill>
         <p:spPr>
           <a:xfrm>
-            <a:off x="6198632" y="5288368"/>
-            <a:ext cx="5818474" cy="1398182"/>
+            <a:off x="6096000" y="5094693"/>
+            <a:ext cx="5959205" cy="1432000"/>
           </a:xfrm>
           <a:prstGeom prst="rect">
             <a:avLst/>
@@ -11644,7 +11451,7 @@
         </p:blipFill>
         <p:spPr>
           <a:xfrm>
-            <a:off x="8423125" y="3517354"/>
+            <a:off x="8415214" y="2778099"/>
             <a:ext cx="3768876" cy="1624762"/>
           </a:xfrm>
           <a:prstGeom prst="rect">
@@ -11666,7 +11473,7 @@
         </p:nvSpPr>
         <p:spPr>
           <a:xfrm>
-            <a:off x="10299652" y="4628476"/>
+            <a:off x="10307563" y="3889222"/>
             <a:ext cx="682775" cy="513639"/>
           </a:xfrm>
           <a:prstGeom prst="ellipse">
@@ -11739,6 +11546,41 @@
           </a:p>
         </p:txBody>
       </p:sp>
+      <p:sp>
+        <p:nvSpPr>
+          <p:cNvPr id="10" name="TextBox 9">
+            <a:extLst>
+              <a:ext uri="{FF2B5EF4-FFF2-40B4-BE49-F238E27FC236}">
+                <a16:creationId xmlns:a16="http://schemas.microsoft.com/office/drawing/2014/main" id="{FB0025AF-4BBE-4D9A-8A72-ADE6ADE947BC}"/>
+              </a:ext>
+            </a:extLst>
+          </p:cNvPr>
+          <p:cNvSpPr txBox="1"/>
+          <p:nvPr/>
+        </p:nvSpPr>
+        <p:spPr>
+          <a:xfrm>
+            <a:off x="7318646" y="6440857"/>
+            <a:ext cx="3911329" cy="369332"/>
+          </a:xfrm>
+          <a:prstGeom prst="rect">
+            <a:avLst/>
+          </a:prstGeom>
+          <a:noFill/>
+        </p:spPr>
+        <p:txBody>
+          <a:bodyPr wrap="square" rtlCol="0">
+            <a:spAutoFit/>
+          </a:bodyPr>
+          <a:lstStyle/>
+          <a:p>
+            <a:r>
+              <a:rPr lang="en-AU" dirty="0"/>
+              <a:t>Temperature sensor comparison table:</a:t>
+            </a:r>
+          </a:p>
+        </p:txBody>
+      </p:sp>
     </p:spTree>
     <p:extLst>
       <p:ext uri="{BB962C8B-B14F-4D97-AF65-F5344CB8AC3E}">
@@ -11752,7 +11594,7 @@
 </p:sld>
 </file>
 
-<file path=ppt/slides/slide7.xml><?xml version="1.0" encoding="utf-8"?>
+<file path=ppt/slides/slide6.xml><?xml version="1.0" encoding="utf-8"?>
 <p:sld xmlns:a="http://schemas.openxmlformats.org/drawingml/2006/main" xmlns:r="http://schemas.openxmlformats.org/officeDocument/2006/relationships" xmlns:p="http://schemas.openxmlformats.org/presentationml/2006/main">
   <p:cSld>
     <p:spTree>
@@ -11769,6 +11611,36 @@
           <a:chExt cx="0" cy="0"/>
         </a:xfrm>
       </p:grpSpPr>
+      <p:pic>
+        <p:nvPicPr>
+          <p:cNvPr id="3" name="Picture 2">
+            <a:extLst>
+              <a:ext uri="{FF2B5EF4-FFF2-40B4-BE49-F238E27FC236}">
+                <a16:creationId xmlns:a16="http://schemas.microsoft.com/office/drawing/2014/main" id="{0E1A493B-266F-4EA6-89A9-47BFC40C425A}"/>
+              </a:ext>
+            </a:extLst>
+          </p:cNvPr>
+          <p:cNvPicPr>
+            <a:picLocks noChangeAspect="1"/>
+          </p:cNvPicPr>
+          <p:nvPr/>
+        </p:nvPicPr>
+        <p:blipFill>
+          <a:blip r:embed="rId3"/>
+          <a:stretch>
+            <a:fillRect/>
+          </a:stretch>
+        </p:blipFill>
+        <p:spPr>
+          <a:xfrm>
+            <a:off x="9222055" y="2642854"/>
+            <a:ext cx="2388919" cy="4083383"/>
+          </a:xfrm>
+          <a:prstGeom prst="rect">
+            <a:avLst/>
+          </a:prstGeom>
+        </p:spPr>
+      </p:pic>
       <p:sp>
         <p:nvSpPr>
           <p:cNvPr id="2" name="Title 1">
@@ -11797,8 +11669,8 @@
           </a:p>
         </p:txBody>
       </p:sp>
-      <mc:AlternateContent xmlns:mc="http://schemas.openxmlformats.org/markup-compatibility/2006" xmlns:a14="http://schemas.microsoft.com/office/drawing/2010/main">
-        <mc:Choice Requires="a14">
+      <mc:AlternateContent xmlns:mc="http://schemas.openxmlformats.org/markup-compatibility/2006">
+        <mc:Choice xmlns:a14="http://schemas.microsoft.com/office/drawing/2010/main" Requires="a14">
           <p:graphicFrame>
             <p:nvGraphicFramePr>
               <p:cNvPr id="4" name="Table 3">
@@ -11814,7 +11686,7 @@
               <p:nvPr>
                 <p:extLst>
                   <p:ext uri="{D42A27DB-BD31-4B8C-83A1-F6EECF244321}">
-                    <p14:modId xmlns:p14="http://schemas.microsoft.com/office/powerpoint/2010/main" val="1032521562"/>
+                    <p14:modId xmlns:p14="http://schemas.microsoft.com/office/powerpoint/2010/main" val="2413705086"/>
                   </p:ext>
                 </p:extLst>
               </p:nvPr>
@@ -12139,8 +12011,26 @@
                             <a:rPr lang="en-AU" sz="2000" u="none" strike="noStrike" dirty="0">
                               <a:effectLst/>
                             </a:rPr>
-                            <a:t>Accuracy of +/-10cm</a:t>
+                            <a:t>Accuracy of </a:t>
                           </a:r>
+                          <a14:m>
+                            <m:oMath xmlns:m="http://schemas.openxmlformats.org/officeDocument/2006/math">
+                              <m:r>
+                                <a:rPr lang="en-AU" sz="2000" i="1" u="none" strike="noStrike" dirty="0" smtClean="0">
+                                  <a:effectLst/>
+                                  <a:latin typeface="Cambria Math" panose="02040503050406030204" pitchFamily="18" charset="0"/>
+                                </a:rPr>
+                                <m:t>±10</m:t>
+                              </m:r>
+                              <m:r>
+                                <a:rPr lang="en-AU" sz="2000" i="1" u="none" strike="noStrike" dirty="0" smtClean="0">
+                                  <a:effectLst/>
+                                  <a:latin typeface="Cambria Math" panose="02040503050406030204" pitchFamily="18" charset="0"/>
+                                </a:rPr>
+                                <m:t>𝑐𝑚</m:t>
+                              </m:r>
+                            </m:oMath>
+                          </a14:m>
                           <a:endParaRPr lang="en-AU" sz="2000" b="0" i="0" u="none" strike="noStrike" dirty="0">
                             <a:solidFill>
                               <a:srgbClr val="000000"/>
@@ -12659,7 +12549,7 @@
             </a:graphic>
           </p:graphicFrame>
         </mc:Choice>
-        <mc:Fallback xmlns="">
+        <mc:Fallback>
           <p:graphicFrame>
             <p:nvGraphicFramePr>
               <p:cNvPr id="4" name="Table 3">
@@ -12675,7 +12565,7 @@
               <p:nvPr>
                 <p:extLst>
                   <p:ext uri="{D42A27DB-BD31-4B8C-83A1-F6EECF244321}">
-                    <p14:modId xmlns:p14="http://schemas.microsoft.com/office/powerpoint/2010/main" val="1032521562"/>
+                    <p14:modId xmlns:p14="http://schemas.microsoft.com/office/powerpoint/2010/main" val="2413705086"/>
                   </p:ext>
                 </p:extLst>
               </p:nvPr>
@@ -12882,7 +12772,7 @@
                           <a:tailEnd type="none" w="med" len="med"/>
                         </a:lnB>
                         <a:blipFill>
-                          <a:blip r:embed="rId3"/>
+                          <a:blip r:embed="rId4"/>
                           <a:stretch>
                             <a:fillRect l="-166" t="-112727" r="-107947" b="-876364"/>
                           </a:stretch>
@@ -12962,20 +12852,7 @@
                         <a:bodyPr/>
                         <a:lstStyle/>
                         <a:p>
-                          <a:pPr algn="l" fontAlgn="b"/>
-                          <a:r>
-                            <a:rPr lang="en-AU" sz="2000" u="none" strike="noStrike" dirty="0">
-                              <a:effectLst/>
-                            </a:rPr>
-                            <a:t>Accuracy of +/-10cm</a:t>
-                          </a:r>
-                          <a:endParaRPr lang="en-AU" sz="2000" b="0" i="0" u="none" strike="noStrike" dirty="0">
-                            <a:solidFill>
-                              <a:srgbClr val="000000"/>
-                            </a:solidFill>
-                            <a:effectLst/>
-                            <a:latin typeface="Calibri" panose="020F0502020204030204" pitchFamily="34" charset="0"/>
-                          </a:endParaRPr>
+                          <a:endParaRPr lang="en-US"/>
                         </a:p>
                       </a:txBody>
                       <a:tcPr marL="9525" marR="9525" marT="9525" marB="0" anchor="b">
@@ -13015,7 +12892,12 @@
                           <a:headEnd type="none" w="med" len="med"/>
                           <a:tailEnd type="none" w="med" len="med"/>
                         </a:lnB>
-                        <a:noFill/>
+                        <a:blipFill>
+                          <a:blip r:embed="rId4"/>
+                          <a:stretch>
+                            <a:fillRect l="-166" t="-76974" r="-107947" b="-217105"/>
+                          </a:stretch>
+                        </a:blipFill>
                       </a:tcPr>
                     </a:tc>
                     <a:tc>
@@ -13538,7 +13420,7 @@
         </p:nvSpPr>
         <p:spPr>
           <a:xfrm>
-            <a:off x="8536426" y="3716143"/>
+            <a:off x="8431716" y="2005607"/>
             <a:ext cx="3547328" cy="923330"/>
           </a:xfrm>
           <a:prstGeom prst="rect">
@@ -13572,7 +13454,7 @@
 </p:sld>
 </file>
 
-<file path=ppt/slides/slide8.xml><?xml version="1.0" encoding="utf-8"?>
+<file path=ppt/slides/slide7.xml><?xml version="1.0" encoding="utf-8"?>
 <p:sld xmlns:a="http://schemas.openxmlformats.org/drawingml/2006/main" xmlns:r="http://schemas.openxmlformats.org/officeDocument/2006/relationships" xmlns:p="http://schemas.openxmlformats.org/presentationml/2006/main">
   <p:cSld>
     <p:spTree>
@@ -13617,8 +13499,8 @@
           </a:p>
         </p:txBody>
       </p:sp>
-      <mc:AlternateContent xmlns:mc="http://schemas.openxmlformats.org/markup-compatibility/2006" xmlns:a14="http://schemas.microsoft.com/office/drawing/2010/main">
-        <mc:Choice Requires="a14">
+      <mc:AlternateContent xmlns:mc="http://schemas.openxmlformats.org/markup-compatibility/2006">
+        <mc:Choice xmlns:a14="http://schemas.microsoft.com/office/drawing/2010/main" Requires="a14">
           <p:graphicFrame>
             <p:nvGraphicFramePr>
               <p:cNvPr id="4" name="Table 3">
@@ -13634,7 +13516,7 @@
               <p:nvPr>
                 <p:extLst>
                   <p:ext uri="{D42A27DB-BD31-4B8C-83A1-F6EECF244321}">
-                    <p14:modId xmlns:p14="http://schemas.microsoft.com/office/powerpoint/2010/main" val="2844859180"/>
+                    <p14:modId xmlns:p14="http://schemas.microsoft.com/office/powerpoint/2010/main" val="3387213627"/>
                   </p:ext>
                 </p:extLst>
               </p:nvPr>
@@ -13959,8 +13841,26 @@
                             <a:rPr lang="en-AU" sz="2000" u="none" strike="noStrike" dirty="0">
                               <a:effectLst/>
                             </a:rPr>
-                            <a:t>Accuracy of +/-10cm</a:t>
+                            <a:t>Accuracy of </a:t>
                           </a:r>
+                          <a14:m>
+                            <m:oMath xmlns:m="http://schemas.openxmlformats.org/officeDocument/2006/math">
+                              <m:r>
+                                <a:rPr lang="en-AU" sz="2000" i="1" u="none" strike="noStrike" dirty="0" smtClean="0">
+                                  <a:effectLst/>
+                                  <a:latin typeface="Cambria Math" panose="02040503050406030204" pitchFamily="18" charset="0"/>
+                                </a:rPr>
+                                <m:t>±10</m:t>
+                              </m:r>
+                              <m:r>
+                                <a:rPr lang="en-AU" sz="2000" i="1" u="none" strike="noStrike" dirty="0" smtClean="0">
+                                  <a:effectLst/>
+                                  <a:latin typeface="Cambria Math" panose="02040503050406030204" pitchFamily="18" charset="0"/>
+                                </a:rPr>
+                                <m:t>𝑐𝑚</m:t>
+                              </m:r>
+                            </m:oMath>
+                          </a14:m>
                           <a:endParaRPr lang="en-AU" sz="2000" b="0" i="0" u="none" strike="noStrike" dirty="0">
                             <a:solidFill>
                               <a:srgbClr val="000000"/>
@@ -14479,7 +14379,7 @@
             </a:graphic>
           </p:graphicFrame>
         </mc:Choice>
-        <mc:Fallback xmlns="">
+        <mc:Fallback>
           <p:graphicFrame>
             <p:nvGraphicFramePr>
               <p:cNvPr id="4" name="Table 3">
@@ -14495,7 +14395,7 @@
               <p:nvPr>
                 <p:extLst>
                   <p:ext uri="{D42A27DB-BD31-4B8C-83A1-F6EECF244321}">
-                    <p14:modId xmlns:p14="http://schemas.microsoft.com/office/powerpoint/2010/main" val="2844859180"/>
+                    <p14:modId xmlns:p14="http://schemas.microsoft.com/office/powerpoint/2010/main" val="3387213627"/>
                   </p:ext>
                 </p:extLst>
               </p:nvPr>
@@ -14782,20 +14682,7 @@
                         <a:bodyPr/>
                         <a:lstStyle/>
                         <a:p>
-                          <a:pPr algn="l" fontAlgn="b"/>
-                          <a:r>
-                            <a:rPr lang="en-AU" sz="2000" u="none" strike="noStrike" dirty="0">
-                              <a:effectLst/>
-                            </a:rPr>
-                            <a:t>Accuracy of +/-10cm</a:t>
-                          </a:r>
-                          <a:endParaRPr lang="en-AU" sz="2000" b="0" i="0" u="none" strike="noStrike" dirty="0">
-                            <a:solidFill>
-                              <a:srgbClr val="000000"/>
-                            </a:solidFill>
-                            <a:effectLst/>
-                            <a:latin typeface="Calibri" panose="020F0502020204030204" pitchFamily="34" charset="0"/>
-                          </a:endParaRPr>
+                          <a:endParaRPr lang="en-US"/>
                         </a:p>
                       </a:txBody>
                       <a:tcPr marL="9525" marR="9525" marT="9525" marB="0" anchor="b">
@@ -14835,7 +14722,12 @@
                           <a:headEnd type="none" w="med" len="med"/>
                           <a:tailEnd type="none" w="med" len="med"/>
                         </a:lnB>
-                        <a:noFill/>
+                        <a:blipFill>
+                          <a:blip r:embed="rId3"/>
+                          <a:stretch>
+                            <a:fillRect l="-166" t="-76974" r="-107947" b="-217105"/>
+                          </a:stretch>
+                        </a:blipFill>
                       </a:tcPr>
                     </a:tc>
                     <a:tc>

</xml_diff>